<commit_message>
Tidying up the code so far
</commit_message>
<xml_diff>
--- a/Output/Al2O3 nc20 initial submodel/Al2O3 RMSEs.pptx
+++ b/Output/Al2O3 nc20 initial submodel/Al2O3 RMSEs.pptx
@@ -9,7 +9,10 @@
     <p:sldId id="257" r:id="rId3"/>
     <p:sldId id="258" r:id="rId4"/>
     <p:sldId id="259" r:id="rId5"/>
-    <p:sldId id="260" r:id="rId6"/>
+    <p:sldId id="262" r:id="rId6"/>
+    <p:sldId id="263" r:id="rId7"/>
+    <p:sldId id="260" r:id="rId8"/>
+    <p:sldId id="261" r:id="rId9"/>
   </p:sldIdLst>
   <p:sldSz cx="9144000" cy="6858000" type="screen4x3"/>
   <p:notesSz cx="6858000" cy="9144000"/>
@@ -292,7 +295,7 @@
           <a:p>
             <a:fld id="{126365E3-0835-4474-A3A3-081B62C3A08D}" type="datetimeFigureOut">
               <a:rPr lang="en-US" smtClean="0"/>
-              <a:t>2/3/2015</a:t>
+              <a:t>2/4/2015</a:t>
             </a:fld>
             <a:endParaRPr lang="en-US"/>
           </a:p>
@@ -462,7 +465,7 @@
           <a:p>
             <a:fld id="{126365E3-0835-4474-A3A3-081B62C3A08D}" type="datetimeFigureOut">
               <a:rPr lang="en-US" smtClean="0"/>
-              <a:t>2/3/2015</a:t>
+              <a:t>2/4/2015</a:t>
             </a:fld>
             <a:endParaRPr lang="en-US"/>
           </a:p>
@@ -642,7 +645,7 @@
           <a:p>
             <a:fld id="{126365E3-0835-4474-A3A3-081B62C3A08D}" type="datetimeFigureOut">
               <a:rPr lang="en-US" smtClean="0"/>
-              <a:t>2/3/2015</a:t>
+              <a:t>2/4/2015</a:t>
             </a:fld>
             <a:endParaRPr lang="en-US"/>
           </a:p>
@@ -812,7 +815,7 @@
           <a:p>
             <a:fld id="{126365E3-0835-4474-A3A3-081B62C3A08D}" type="datetimeFigureOut">
               <a:rPr lang="en-US" smtClean="0"/>
-              <a:t>2/3/2015</a:t>
+              <a:t>2/4/2015</a:t>
             </a:fld>
             <a:endParaRPr lang="en-US"/>
           </a:p>
@@ -1058,7 +1061,7 @@
           <a:p>
             <a:fld id="{126365E3-0835-4474-A3A3-081B62C3A08D}" type="datetimeFigureOut">
               <a:rPr lang="en-US" smtClean="0"/>
-              <a:t>2/3/2015</a:t>
+              <a:t>2/4/2015</a:t>
             </a:fld>
             <a:endParaRPr lang="en-US"/>
           </a:p>
@@ -1346,7 +1349,7 @@
           <a:p>
             <a:fld id="{126365E3-0835-4474-A3A3-081B62C3A08D}" type="datetimeFigureOut">
               <a:rPr lang="en-US" smtClean="0"/>
-              <a:t>2/3/2015</a:t>
+              <a:t>2/4/2015</a:t>
             </a:fld>
             <a:endParaRPr lang="en-US"/>
           </a:p>
@@ -1768,7 +1771,7 @@
           <a:p>
             <a:fld id="{126365E3-0835-4474-A3A3-081B62C3A08D}" type="datetimeFigureOut">
               <a:rPr lang="en-US" smtClean="0"/>
-              <a:t>2/3/2015</a:t>
+              <a:t>2/4/2015</a:t>
             </a:fld>
             <a:endParaRPr lang="en-US"/>
           </a:p>
@@ -1886,7 +1889,7 @@
           <a:p>
             <a:fld id="{126365E3-0835-4474-A3A3-081B62C3A08D}" type="datetimeFigureOut">
               <a:rPr lang="en-US" smtClean="0"/>
-              <a:t>2/3/2015</a:t>
+              <a:t>2/4/2015</a:t>
             </a:fld>
             <a:endParaRPr lang="en-US"/>
           </a:p>
@@ -1981,7 +1984,7 @@
           <a:p>
             <a:fld id="{126365E3-0835-4474-A3A3-081B62C3A08D}" type="datetimeFigureOut">
               <a:rPr lang="en-US" smtClean="0"/>
-              <a:t>2/3/2015</a:t>
+              <a:t>2/4/2015</a:t>
             </a:fld>
             <a:endParaRPr lang="en-US"/>
           </a:p>
@@ -2258,7 +2261,7 @@
           <a:p>
             <a:fld id="{126365E3-0835-4474-A3A3-081B62C3A08D}" type="datetimeFigureOut">
               <a:rPr lang="en-US" smtClean="0"/>
-              <a:t>2/3/2015</a:t>
+              <a:t>2/4/2015</a:t>
             </a:fld>
             <a:endParaRPr lang="en-US"/>
           </a:p>
@@ -2511,7 +2514,7 @@
           <a:p>
             <a:fld id="{126365E3-0835-4474-A3A3-081B62C3A08D}" type="datetimeFigureOut">
               <a:rPr lang="en-US" smtClean="0"/>
-              <a:t>2/3/2015</a:t>
+              <a:t>2/4/2015</a:t>
             </a:fld>
             <a:endParaRPr lang="en-US"/>
           </a:p>
@@ -2724,7 +2727,7 @@
           <a:p>
             <a:fld id="{126365E3-0835-4474-A3A3-081B62C3A08D}" type="datetimeFigureOut">
               <a:rPr lang="en-US" smtClean="0"/>
-              <a:t>2/3/2015</a:t>
+              <a:t>2/4/2015</a:t>
             </a:fld>
             <a:endParaRPr lang="en-US"/>
           </a:p>
@@ -3353,6 +3356,78 @@
           </a:p>
         </p:txBody>
       </p:sp>
+      <p:cxnSp>
+        <p:nvCxnSpPr>
+          <p:cNvPr id="3" name="Straight Connector 2"/>
+          <p:cNvCxnSpPr/>
+          <p:nvPr/>
+        </p:nvCxnSpPr>
+        <p:spPr>
+          <a:xfrm>
+            <a:off x="1447800" y="3810000"/>
+            <a:ext cx="0" cy="2667000"/>
+          </a:xfrm>
+          <a:prstGeom prst="line">
+            <a:avLst/>
+          </a:prstGeom>
+          <a:ln w="38100">
+            <a:solidFill>
+              <a:srgbClr val="00FF00"/>
+            </a:solidFill>
+            <a:prstDash val="dash"/>
+          </a:ln>
+        </p:spPr>
+        <p:style>
+          <a:lnRef idx="1">
+            <a:schemeClr val="accent1"/>
+          </a:lnRef>
+          <a:fillRef idx="0">
+            <a:schemeClr val="accent1"/>
+          </a:fillRef>
+          <a:effectRef idx="0">
+            <a:schemeClr val="accent1"/>
+          </a:effectRef>
+          <a:fontRef idx="minor">
+            <a:schemeClr val="tx1"/>
+          </a:fontRef>
+        </p:style>
+      </p:cxnSp>
+      <p:cxnSp>
+        <p:nvCxnSpPr>
+          <p:cNvPr id="10" name="Straight Connector 9"/>
+          <p:cNvCxnSpPr/>
+          <p:nvPr/>
+        </p:nvCxnSpPr>
+        <p:spPr>
+          <a:xfrm>
+            <a:off x="6096000" y="3886200"/>
+            <a:ext cx="0" cy="2667000"/>
+          </a:xfrm>
+          <a:prstGeom prst="line">
+            <a:avLst/>
+          </a:prstGeom>
+          <a:ln w="38100">
+            <a:solidFill>
+              <a:srgbClr val="00FF00"/>
+            </a:solidFill>
+            <a:prstDash val="dash"/>
+          </a:ln>
+        </p:spPr>
+        <p:style>
+          <a:lnRef idx="1">
+            <a:schemeClr val="accent1"/>
+          </a:lnRef>
+          <a:fillRef idx="0">
+            <a:schemeClr val="accent1"/>
+          </a:fillRef>
+          <a:effectRef idx="0">
+            <a:schemeClr val="accent1"/>
+          </a:effectRef>
+          <a:fontRef idx="minor">
+            <a:schemeClr val="tx1"/>
+          </a:fontRef>
+        </p:style>
+      </p:cxnSp>
     </p:spTree>
     <p:extLst>
       <p:ext uri="{BB962C8B-B14F-4D97-AF65-F5344CB8AC3E}">
@@ -3565,6 +3640,78 @@
           </a:p>
         </p:txBody>
       </p:sp>
+      <p:cxnSp>
+        <p:nvCxnSpPr>
+          <p:cNvPr id="8" name="Straight Connector 7"/>
+          <p:cNvCxnSpPr/>
+          <p:nvPr/>
+        </p:nvCxnSpPr>
+        <p:spPr>
+          <a:xfrm>
+            <a:off x="1447800" y="3886200"/>
+            <a:ext cx="0" cy="2667000"/>
+          </a:xfrm>
+          <a:prstGeom prst="line">
+            <a:avLst/>
+          </a:prstGeom>
+          <a:ln w="38100">
+            <a:solidFill>
+              <a:srgbClr val="00FF00"/>
+            </a:solidFill>
+            <a:prstDash val="dash"/>
+          </a:ln>
+        </p:spPr>
+        <p:style>
+          <a:lnRef idx="1">
+            <a:schemeClr val="accent1"/>
+          </a:lnRef>
+          <a:fillRef idx="0">
+            <a:schemeClr val="accent1"/>
+          </a:fillRef>
+          <a:effectRef idx="0">
+            <a:schemeClr val="accent1"/>
+          </a:effectRef>
+          <a:fontRef idx="minor">
+            <a:schemeClr val="tx1"/>
+          </a:fontRef>
+        </p:style>
+      </p:cxnSp>
+      <p:cxnSp>
+        <p:nvCxnSpPr>
+          <p:cNvPr id="9" name="Straight Connector 8"/>
+          <p:cNvCxnSpPr/>
+          <p:nvPr/>
+        </p:nvCxnSpPr>
+        <p:spPr>
+          <a:xfrm>
+            <a:off x="6096000" y="3886200"/>
+            <a:ext cx="0" cy="2667000"/>
+          </a:xfrm>
+          <a:prstGeom prst="line">
+            <a:avLst/>
+          </a:prstGeom>
+          <a:ln w="38100">
+            <a:solidFill>
+              <a:srgbClr val="00FF00"/>
+            </a:solidFill>
+            <a:prstDash val="dash"/>
+          </a:ln>
+        </p:spPr>
+        <p:style>
+          <a:lnRef idx="1">
+            <a:schemeClr val="accent1"/>
+          </a:lnRef>
+          <a:fillRef idx="0">
+            <a:schemeClr val="accent1"/>
+          </a:fillRef>
+          <a:effectRef idx="0">
+            <a:schemeClr val="accent1"/>
+          </a:effectRef>
+          <a:fontRef idx="minor">
+            <a:schemeClr val="tx1"/>
+          </a:fontRef>
+        </p:style>
+      </p:cxnSp>
     </p:spTree>
     <p:extLst>
       <p:ext uri="{BB962C8B-B14F-4D97-AF65-F5344CB8AC3E}">
@@ -3777,6 +3924,78 @@
           </a:p>
         </p:txBody>
       </p:sp>
+      <p:cxnSp>
+        <p:nvCxnSpPr>
+          <p:cNvPr id="8" name="Straight Connector 7"/>
+          <p:cNvCxnSpPr/>
+          <p:nvPr/>
+        </p:nvCxnSpPr>
+        <p:spPr>
+          <a:xfrm>
+            <a:off x="1295400" y="3886200"/>
+            <a:ext cx="0" cy="2667000"/>
+          </a:xfrm>
+          <a:prstGeom prst="line">
+            <a:avLst/>
+          </a:prstGeom>
+          <a:ln w="38100">
+            <a:solidFill>
+              <a:srgbClr val="00FF00"/>
+            </a:solidFill>
+            <a:prstDash val="dash"/>
+          </a:ln>
+        </p:spPr>
+        <p:style>
+          <a:lnRef idx="1">
+            <a:schemeClr val="accent1"/>
+          </a:lnRef>
+          <a:fillRef idx="0">
+            <a:schemeClr val="accent1"/>
+          </a:fillRef>
+          <a:effectRef idx="0">
+            <a:schemeClr val="accent1"/>
+          </a:effectRef>
+          <a:fontRef idx="minor">
+            <a:schemeClr val="tx1"/>
+          </a:fontRef>
+        </p:style>
+      </p:cxnSp>
+      <p:cxnSp>
+        <p:nvCxnSpPr>
+          <p:cNvPr id="9" name="Straight Connector 8"/>
+          <p:cNvCxnSpPr/>
+          <p:nvPr/>
+        </p:nvCxnSpPr>
+        <p:spPr>
+          <a:xfrm>
+            <a:off x="5943600" y="3886200"/>
+            <a:ext cx="0" cy="2667000"/>
+          </a:xfrm>
+          <a:prstGeom prst="line">
+            <a:avLst/>
+          </a:prstGeom>
+          <a:ln w="38100">
+            <a:solidFill>
+              <a:srgbClr val="00FF00"/>
+            </a:solidFill>
+            <a:prstDash val="dash"/>
+          </a:ln>
+        </p:spPr>
+        <p:style>
+          <a:lnRef idx="1">
+            <a:schemeClr val="accent1"/>
+          </a:lnRef>
+          <a:fillRef idx="0">
+            <a:schemeClr val="accent1"/>
+          </a:fillRef>
+          <a:effectRef idx="0">
+            <a:schemeClr val="accent1"/>
+          </a:effectRef>
+          <a:fontRef idx="minor">
+            <a:schemeClr val="tx1"/>
+          </a:fontRef>
+        </p:style>
+      </p:cxnSp>
     </p:spTree>
     <p:extLst>
       <p:ext uri="{BB962C8B-B14F-4D97-AF65-F5344CB8AC3E}">
@@ -3791,6 +4010,306 @@
 </file>
 
 <file path=ppt/slides/slide5.xml><?xml version="1.0" encoding="utf-8"?>
+<p:sld xmlns:a="http://schemas.openxmlformats.org/drawingml/2006/main" xmlns:r="http://schemas.openxmlformats.org/officeDocument/2006/relationships" xmlns:p="http://schemas.openxmlformats.org/presentationml/2006/main">
+  <p:cSld>
+    <p:spTree>
+      <p:nvGrpSpPr>
+        <p:cNvPr id="1" name=""/>
+        <p:cNvGrpSpPr/>
+        <p:nvPr/>
+      </p:nvGrpSpPr>
+      <p:grpSpPr>
+        <a:xfrm>
+          <a:off x="0" y="0"/>
+          <a:ext cx="0" cy="0"/>
+          <a:chOff x="0" y="0"/>
+          <a:chExt cx="0" cy="0"/>
+        </a:xfrm>
+      </p:grpSpPr>
+      <p:pic>
+        <p:nvPicPr>
+          <p:cNvPr id="6" name="Picture 5"/>
+          <p:cNvPicPr>
+            <a:picLocks noChangeAspect="1"/>
+          </p:cNvPicPr>
+          <p:nvPr/>
+        </p:nvPicPr>
+        <p:blipFill>
+          <a:blip r:embed="rId2">
+            <a:extLst>
+              <a:ext uri="{28A0092B-C50C-407E-A947-70E740481C1C}">
+                <a14:useLocalDpi xmlns:a14="http://schemas.microsoft.com/office/drawing/2010/main" val="0"/>
+              </a:ext>
+            </a:extLst>
+          </a:blip>
+          <a:stretch>
+            <a:fillRect/>
+          </a:stretch>
+        </p:blipFill>
+        <p:spPr>
+          <a:xfrm>
+            <a:off x="4647303" y="3383280"/>
+            <a:ext cx="4496697" cy="3474720"/>
+          </a:xfrm>
+          <a:prstGeom prst="rect">
+            <a:avLst/>
+          </a:prstGeom>
+        </p:spPr>
+      </p:pic>
+      <p:pic>
+        <p:nvPicPr>
+          <p:cNvPr id="7" name="Picture 6"/>
+          <p:cNvPicPr>
+            <a:picLocks noChangeAspect="1"/>
+          </p:cNvPicPr>
+          <p:nvPr/>
+        </p:nvPicPr>
+        <p:blipFill>
+          <a:blip r:embed="rId3">
+            <a:extLst>
+              <a:ext uri="{28A0092B-C50C-407E-A947-70E740481C1C}">
+                <a14:useLocalDpi xmlns:a14="http://schemas.microsoft.com/office/drawing/2010/main" val="0"/>
+              </a:ext>
+            </a:extLst>
+          </a:blip>
+          <a:stretch>
+            <a:fillRect/>
+          </a:stretch>
+        </p:blipFill>
+        <p:spPr>
+          <a:xfrm>
+            <a:off x="0" y="3383280"/>
+            <a:ext cx="4496697" cy="3474720"/>
+          </a:xfrm>
+          <a:prstGeom prst="rect">
+            <a:avLst/>
+          </a:prstGeom>
+        </p:spPr>
+      </p:pic>
+      <p:pic>
+        <p:nvPicPr>
+          <p:cNvPr id="4" name="Picture 3"/>
+          <p:cNvPicPr>
+            <a:picLocks noChangeAspect="1"/>
+          </p:cNvPicPr>
+          <p:nvPr/>
+        </p:nvPicPr>
+        <p:blipFill>
+          <a:blip r:embed="rId4">
+            <a:extLst>
+              <a:ext uri="{28A0092B-C50C-407E-A947-70E740481C1C}">
+                <a14:useLocalDpi xmlns:a14="http://schemas.microsoft.com/office/drawing/2010/main" val="0"/>
+              </a:ext>
+            </a:extLst>
+          </a:blip>
+          <a:stretch>
+            <a:fillRect/>
+          </a:stretch>
+        </p:blipFill>
+        <p:spPr>
+          <a:xfrm>
+            <a:off x="4647303" y="0"/>
+            <a:ext cx="4496697" cy="3474720"/>
+          </a:xfrm>
+          <a:prstGeom prst="rect">
+            <a:avLst/>
+          </a:prstGeom>
+        </p:spPr>
+      </p:pic>
+      <p:pic>
+        <p:nvPicPr>
+          <p:cNvPr id="5" name="Picture 4"/>
+          <p:cNvPicPr>
+            <a:picLocks noChangeAspect="1"/>
+          </p:cNvPicPr>
+          <p:nvPr/>
+        </p:nvPicPr>
+        <p:blipFill>
+          <a:blip r:embed="rId5">
+            <a:extLst>
+              <a:ext uri="{28A0092B-C50C-407E-A947-70E740481C1C}">
+                <a14:useLocalDpi xmlns:a14="http://schemas.microsoft.com/office/drawing/2010/main" val="0"/>
+              </a:ext>
+            </a:extLst>
+          </a:blip>
+          <a:stretch>
+            <a:fillRect/>
+          </a:stretch>
+        </p:blipFill>
+        <p:spPr>
+          <a:xfrm>
+            <a:off x="0" y="0"/>
+            <a:ext cx="4496697" cy="3474720"/>
+          </a:xfrm>
+          <a:prstGeom prst="rect">
+            <a:avLst/>
+          </a:prstGeom>
+        </p:spPr>
+      </p:pic>
+      <p:sp>
+        <p:nvSpPr>
+          <p:cNvPr id="2" name="TextBox 1"/>
+          <p:cNvSpPr txBox="1"/>
+          <p:nvPr/>
+        </p:nvSpPr>
+        <p:spPr>
+          <a:xfrm>
+            <a:off x="3810000" y="0"/>
+            <a:ext cx="1524000" cy="646331"/>
+          </a:xfrm>
+          <a:prstGeom prst="rect">
+            <a:avLst/>
+          </a:prstGeom>
+          <a:noFill/>
+        </p:spPr>
+        <p:txBody>
+          <a:bodyPr wrap="square" rtlCol="0">
+            <a:spAutoFit/>
+          </a:bodyPr>
+          <a:lstStyle/>
+          <a:p>
+            <a:pPr algn="ctr"/>
+            <a:r>
+              <a:rPr lang="en-US" dirty="0" err="1" smtClean="0"/>
+              <a:t>MidLow</a:t>
+            </a:r>
+            <a:r>
+              <a:rPr lang="en-US" dirty="0" smtClean="0"/>
+              <a:t> </a:t>
+            </a:r>
+            <a:r>
+              <a:rPr lang="en-US" dirty="0" smtClean="0"/>
+              <a:t>- Norm3</a:t>
+            </a:r>
+            <a:endParaRPr lang="en-US" dirty="0"/>
+          </a:p>
+        </p:txBody>
+      </p:sp>
+      <p:sp>
+        <p:nvSpPr>
+          <p:cNvPr id="3" name="TextBox 2"/>
+          <p:cNvSpPr txBox="1"/>
+          <p:nvPr/>
+        </p:nvSpPr>
+        <p:spPr>
+          <a:xfrm>
+            <a:off x="3962400" y="3288268"/>
+            <a:ext cx="1524000" cy="646331"/>
+          </a:xfrm>
+          <a:prstGeom prst="rect">
+            <a:avLst/>
+          </a:prstGeom>
+          <a:noFill/>
+        </p:spPr>
+        <p:txBody>
+          <a:bodyPr wrap="square" rtlCol="0">
+            <a:spAutoFit/>
+          </a:bodyPr>
+          <a:lstStyle/>
+          <a:p>
+            <a:pPr algn="ctr"/>
+            <a:r>
+              <a:rPr lang="en-US" dirty="0" err="1" smtClean="0"/>
+              <a:t>MidLow</a:t>
+            </a:r>
+            <a:r>
+              <a:rPr lang="en-US" dirty="0" smtClean="0"/>
+              <a:t> </a:t>
+            </a:r>
+            <a:r>
+              <a:rPr lang="en-US" dirty="0" smtClean="0"/>
+              <a:t>- Norm1</a:t>
+            </a:r>
+            <a:endParaRPr lang="en-US" dirty="0"/>
+          </a:p>
+        </p:txBody>
+      </p:sp>
+      <p:cxnSp>
+        <p:nvCxnSpPr>
+          <p:cNvPr id="8" name="Straight Connector 7"/>
+          <p:cNvCxnSpPr/>
+          <p:nvPr/>
+        </p:nvCxnSpPr>
+        <p:spPr>
+          <a:xfrm>
+            <a:off x="1447800" y="3886200"/>
+            <a:ext cx="0" cy="2667000"/>
+          </a:xfrm>
+          <a:prstGeom prst="line">
+            <a:avLst/>
+          </a:prstGeom>
+          <a:ln w="38100">
+            <a:solidFill>
+              <a:srgbClr val="00FF00"/>
+            </a:solidFill>
+            <a:prstDash val="dash"/>
+          </a:ln>
+        </p:spPr>
+        <p:style>
+          <a:lnRef idx="1">
+            <a:schemeClr val="accent1"/>
+          </a:lnRef>
+          <a:fillRef idx="0">
+            <a:schemeClr val="accent1"/>
+          </a:fillRef>
+          <a:effectRef idx="0">
+            <a:schemeClr val="accent1"/>
+          </a:effectRef>
+          <a:fontRef idx="minor">
+            <a:schemeClr val="tx1"/>
+          </a:fontRef>
+        </p:style>
+      </p:cxnSp>
+      <p:cxnSp>
+        <p:nvCxnSpPr>
+          <p:cNvPr id="9" name="Straight Connector 8"/>
+          <p:cNvCxnSpPr/>
+          <p:nvPr/>
+        </p:nvCxnSpPr>
+        <p:spPr>
+          <a:xfrm>
+            <a:off x="6096000" y="3810000"/>
+            <a:ext cx="0" cy="2667000"/>
+          </a:xfrm>
+          <a:prstGeom prst="line">
+            <a:avLst/>
+          </a:prstGeom>
+          <a:ln w="38100">
+            <a:solidFill>
+              <a:srgbClr val="00FF00"/>
+            </a:solidFill>
+            <a:prstDash val="dash"/>
+          </a:ln>
+        </p:spPr>
+        <p:style>
+          <a:lnRef idx="1">
+            <a:schemeClr val="accent1"/>
+          </a:lnRef>
+          <a:fillRef idx="0">
+            <a:schemeClr val="accent1"/>
+          </a:fillRef>
+          <a:effectRef idx="0">
+            <a:schemeClr val="accent1"/>
+          </a:effectRef>
+          <a:fontRef idx="minor">
+            <a:schemeClr val="tx1"/>
+          </a:fontRef>
+        </p:style>
+      </p:cxnSp>
+    </p:spTree>
+    <p:extLst>
+      <p:ext uri="{BB962C8B-B14F-4D97-AF65-F5344CB8AC3E}">
+        <p14:creationId xmlns:p14="http://schemas.microsoft.com/office/powerpoint/2010/main" val="620113647"/>
+      </p:ext>
+    </p:extLst>
+  </p:cSld>
+  <p:clrMapOvr>
+    <a:masterClrMapping/>
+  </p:clrMapOvr>
+</p:sld>
+</file>
+
+<file path=ppt/slides/slide6.xml><?xml version="1.0" encoding="utf-8"?>
 <p:sld xmlns:a="http://schemas.openxmlformats.org/drawingml/2006/main" xmlns:r="http://schemas.openxmlformats.org/officeDocument/2006/relationships" xmlns:p="http://schemas.openxmlformats.org/presentationml/2006/main">
   <p:cSld>
     <p:spTree>
@@ -3829,7 +4348,7 @@
         </p:blipFill>
         <p:spPr>
           <a:xfrm>
-            <a:off x="-9525" y="3383280"/>
+            <a:off x="4647303" y="3383280"/>
             <a:ext cx="4496697" cy="3474720"/>
           </a:xfrm>
           <a:prstGeom prst="rect">
@@ -3859,6 +4378,306 @@
         </p:blipFill>
         <p:spPr>
           <a:xfrm>
+            <a:off x="0" y="3383280"/>
+            <a:ext cx="4496697" cy="3474720"/>
+          </a:xfrm>
+          <a:prstGeom prst="rect">
+            <a:avLst/>
+          </a:prstGeom>
+        </p:spPr>
+      </p:pic>
+      <p:pic>
+        <p:nvPicPr>
+          <p:cNvPr id="4" name="Picture 3"/>
+          <p:cNvPicPr>
+            <a:picLocks noChangeAspect="1"/>
+          </p:cNvPicPr>
+          <p:nvPr/>
+        </p:nvPicPr>
+        <p:blipFill>
+          <a:blip r:embed="rId4">
+            <a:extLst>
+              <a:ext uri="{28A0092B-C50C-407E-A947-70E740481C1C}">
+                <a14:useLocalDpi xmlns:a14="http://schemas.microsoft.com/office/drawing/2010/main" val="0"/>
+              </a:ext>
+            </a:extLst>
+          </a:blip>
+          <a:stretch>
+            <a:fillRect/>
+          </a:stretch>
+        </p:blipFill>
+        <p:spPr>
+          <a:xfrm>
+            <a:off x="4647303" y="0"/>
+            <a:ext cx="4496697" cy="3474720"/>
+          </a:xfrm>
+          <a:prstGeom prst="rect">
+            <a:avLst/>
+          </a:prstGeom>
+        </p:spPr>
+      </p:pic>
+      <p:pic>
+        <p:nvPicPr>
+          <p:cNvPr id="5" name="Picture 4"/>
+          <p:cNvPicPr>
+            <a:picLocks noChangeAspect="1"/>
+          </p:cNvPicPr>
+          <p:nvPr/>
+        </p:nvPicPr>
+        <p:blipFill>
+          <a:blip r:embed="rId5">
+            <a:extLst>
+              <a:ext uri="{28A0092B-C50C-407E-A947-70E740481C1C}">
+                <a14:useLocalDpi xmlns:a14="http://schemas.microsoft.com/office/drawing/2010/main" val="0"/>
+              </a:ext>
+            </a:extLst>
+          </a:blip>
+          <a:stretch>
+            <a:fillRect/>
+          </a:stretch>
+        </p:blipFill>
+        <p:spPr>
+          <a:xfrm>
+            <a:off x="0" y="0"/>
+            <a:ext cx="4496697" cy="3474720"/>
+          </a:xfrm>
+          <a:prstGeom prst="rect">
+            <a:avLst/>
+          </a:prstGeom>
+        </p:spPr>
+      </p:pic>
+      <p:sp>
+        <p:nvSpPr>
+          <p:cNvPr id="2" name="TextBox 1"/>
+          <p:cNvSpPr txBox="1"/>
+          <p:nvPr/>
+        </p:nvSpPr>
+        <p:spPr>
+          <a:xfrm>
+            <a:off x="3810000" y="0"/>
+            <a:ext cx="1524000" cy="646331"/>
+          </a:xfrm>
+          <a:prstGeom prst="rect">
+            <a:avLst/>
+          </a:prstGeom>
+          <a:noFill/>
+        </p:spPr>
+        <p:txBody>
+          <a:bodyPr wrap="square" rtlCol="0">
+            <a:spAutoFit/>
+          </a:bodyPr>
+          <a:lstStyle/>
+          <a:p>
+            <a:pPr algn="ctr"/>
+            <a:r>
+              <a:rPr lang="en-US" dirty="0" err="1" smtClean="0"/>
+              <a:t>MidHigh</a:t>
+            </a:r>
+            <a:r>
+              <a:rPr lang="en-US" dirty="0" smtClean="0"/>
+              <a:t> </a:t>
+            </a:r>
+            <a:r>
+              <a:rPr lang="en-US" dirty="0" smtClean="0"/>
+              <a:t>- Norm3</a:t>
+            </a:r>
+            <a:endParaRPr lang="en-US" dirty="0"/>
+          </a:p>
+        </p:txBody>
+      </p:sp>
+      <p:sp>
+        <p:nvSpPr>
+          <p:cNvPr id="3" name="TextBox 2"/>
+          <p:cNvSpPr txBox="1"/>
+          <p:nvPr/>
+        </p:nvSpPr>
+        <p:spPr>
+          <a:xfrm>
+            <a:off x="3962400" y="3288268"/>
+            <a:ext cx="1524000" cy="646331"/>
+          </a:xfrm>
+          <a:prstGeom prst="rect">
+            <a:avLst/>
+          </a:prstGeom>
+          <a:noFill/>
+        </p:spPr>
+        <p:txBody>
+          <a:bodyPr wrap="square" rtlCol="0">
+            <a:spAutoFit/>
+          </a:bodyPr>
+          <a:lstStyle/>
+          <a:p>
+            <a:pPr algn="ctr"/>
+            <a:r>
+              <a:rPr lang="en-US" dirty="0" err="1" smtClean="0"/>
+              <a:t>MidHigh</a:t>
+            </a:r>
+            <a:r>
+              <a:rPr lang="en-US" dirty="0" smtClean="0"/>
+              <a:t> </a:t>
+            </a:r>
+            <a:r>
+              <a:rPr lang="en-US" dirty="0" smtClean="0"/>
+              <a:t>- Norm1</a:t>
+            </a:r>
+            <a:endParaRPr lang="en-US" dirty="0"/>
+          </a:p>
+        </p:txBody>
+      </p:sp>
+      <p:cxnSp>
+        <p:nvCxnSpPr>
+          <p:cNvPr id="8" name="Straight Connector 7"/>
+          <p:cNvCxnSpPr/>
+          <p:nvPr/>
+        </p:nvCxnSpPr>
+        <p:spPr>
+          <a:xfrm>
+            <a:off x="5943600" y="3810000"/>
+            <a:ext cx="0" cy="2667000"/>
+          </a:xfrm>
+          <a:prstGeom prst="line">
+            <a:avLst/>
+          </a:prstGeom>
+          <a:ln w="38100">
+            <a:solidFill>
+              <a:srgbClr val="00FF00"/>
+            </a:solidFill>
+            <a:prstDash val="dash"/>
+          </a:ln>
+        </p:spPr>
+        <p:style>
+          <a:lnRef idx="1">
+            <a:schemeClr val="accent1"/>
+          </a:lnRef>
+          <a:fillRef idx="0">
+            <a:schemeClr val="accent1"/>
+          </a:fillRef>
+          <a:effectRef idx="0">
+            <a:schemeClr val="accent1"/>
+          </a:effectRef>
+          <a:fontRef idx="minor">
+            <a:schemeClr val="tx1"/>
+          </a:fontRef>
+        </p:style>
+      </p:cxnSp>
+      <p:cxnSp>
+        <p:nvCxnSpPr>
+          <p:cNvPr id="9" name="Straight Connector 8"/>
+          <p:cNvCxnSpPr/>
+          <p:nvPr/>
+        </p:nvCxnSpPr>
+        <p:spPr>
+          <a:xfrm>
+            <a:off x="1295400" y="3810000"/>
+            <a:ext cx="0" cy="2667000"/>
+          </a:xfrm>
+          <a:prstGeom prst="line">
+            <a:avLst/>
+          </a:prstGeom>
+          <a:ln w="38100">
+            <a:solidFill>
+              <a:srgbClr val="00FF00"/>
+            </a:solidFill>
+            <a:prstDash val="dash"/>
+          </a:ln>
+        </p:spPr>
+        <p:style>
+          <a:lnRef idx="1">
+            <a:schemeClr val="accent1"/>
+          </a:lnRef>
+          <a:fillRef idx="0">
+            <a:schemeClr val="accent1"/>
+          </a:fillRef>
+          <a:effectRef idx="0">
+            <a:schemeClr val="accent1"/>
+          </a:effectRef>
+          <a:fontRef idx="minor">
+            <a:schemeClr val="tx1"/>
+          </a:fontRef>
+        </p:style>
+      </p:cxnSp>
+    </p:spTree>
+    <p:extLst>
+      <p:ext uri="{BB962C8B-B14F-4D97-AF65-F5344CB8AC3E}">
+        <p14:creationId xmlns:p14="http://schemas.microsoft.com/office/powerpoint/2010/main" val="2395702154"/>
+      </p:ext>
+    </p:extLst>
+  </p:cSld>
+  <p:clrMapOvr>
+    <a:masterClrMapping/>
+  </p:clrMapOvr>
+</p:sld>
+</file>
+
+<file path=ppt/slides/slide7.xml><?xml version="1.0" encoding="utf-8"?>
+<p:sld xmlns:a="http://schemas.openxmlformats.org/drawingml/2006/main" xmlns:r="http://schemas.openxmlformats.org/officeDocument/2006/relationships" xmlns:p="http://schemas.openxmlformats.org/presentationml/2006/main">
+  <p:cSld>
+    <p:spTree>
+      <p:nvGrpSpPr>
+        <p:cNvPr id="1" name=""/>
+        <p:cNvGrpSpPr/>
+        <p:nvPr/>
+      </p:nvGrpSpPr>
+      <p:grpSpPr>
+        <a:xfrm>
+          <a:off x="0" y="0"/>
+          <a:ext cx="0" cy="0"/>
+          <a:chOff x="0" y="0"/>
+          <a:chExt cx="0" cy="0"/>
+        </a:xfrm>
+      </p:grpSpPr>
+      <p:pic>
+        <p:nvPicPr>
+          <p:cNvPr id="7" name="Picture 6"/>
+          <p:cNvPicPr>
+            <a:picLocks noChangeAspect="1"/>
+          </p:cNvPicPr>
+          <p:nvPr/>
+        </p:nvPicPr>
+        <p:blipFill>
+          <a:blip r:embed="rId2">
+            <a:extLst>
+              <a:ext uri="{28A0092B-C50C-407E-A947-70E740481C1C}">
+                <a14:useLocalDpi xmlns:a14="http://schemas.microsoft.com/office/drawing/2010/main" val="0"/>
+              </a:ext>
+            </a:extLst>
+          </a:blip>
+          <a:stretch>
+            <a:fillRect/>
+          </a:stretch>
+        </p:blipFill>
+        <p:spPr>
+          <a:xfrm>
+            <a:off x="-9525" y="3383280"/>
+            <a:ext cx="4496697" cy="3474720"/>
+          </a:xfrm>
+          <a:prstGeom prst="rect">
+            <a:avLst/>
+          </a:prstGeom>
+        </p:spPr>
+      </p:pic>
+      <p:pic>
+        <p:nvPicPr>
+          <p:cNvPr id="6" name="Picture 5"/>
+          <p:cNvPicPr>
+            <a:picLocks noChangeAspect="1"/>
+          </p:cNvPicPr>
+          <p:nvPr/>
+        </p:nvPicPr>
+        <p:blipFill>
+          <a:blip r:embed="rId3">
+            <a:extLst>
+              <a:ext uri="{28A0092B-C50C-407E-A947-70E740481C1C}">
+                <a14:useLocalDpi xmlns:a14="http://schemas.microsoft.com/office/drawing/2010/main" val="0"/>
+              </a:ext>
+            </a:extLst>
+          </a:blip>
+          <a:stretch>
+            <a:fillRect/>
+          </a:stretch>
+        </p:blipFill>
+        <p:spPr>
+          <a:xfrm>
             <a:off x="4637778" y="3383280"/>
             <a:ext cx="4496697" cy="3474720"/>
           </a:xfrm>
@@ -3989,10 +4808,839 @@
           </a:p>
         </p:txBody>
       </p:sp>
+      <p:cxnSp>
+        <p:nvCxnSpPr>
+          <p:cNvPr id="8" name="Straight Connector 7"/>
+          <p:cNvCxnSpPr/>
+          <p:nvPr/>
+        </p:nvCxnSpPr>
+        <p:spPr>
+          <a:xfrm>
+            <a:off x="1600200" y="3886200"/>
+            <a:ext cx="0" cy="2667000"/>
+          </a:xfrm>
+          <a:prstGeom prst="line">
+            <a:avLst/>
+          </a:prstGeom>
+          <a:ln w="38100">
+            <a:solidFill>
+              <a:srgbClr val="00FF00"/>
+            </a:solidFill>
+            <a:prstDash val="dash"/>
+          </a:ln>
+        </p:spPr>
+        <p:style>
+          <a:lnRef idx="1">
+            <a:schemeClr val="accent1"/>
+          </a:lnRef>
+          <a:fillRef idx="0">
+            <a:schemeClr val="accent1"/>
+          </a:fillRef>
+          <a:effectRef idx="0">
+            <a:schemeClr val="accent1"/>
+          </a:effectRef>
+          <a:fontRef idx="minor">
+            <a:schemeClr val="tx1"/>
+          </a:fontRef>
+        </p:style>
+      </p:cxnSp>
+      <p:cxnSp>
+        <p:nvCxnSpPr>
+          <p:cNvPr id="9" name="Straight Connector 8"/>
+          <p:cNvCxnSpPr/>
+          <p:nvPr/>
+        </p:nvCxnSpPr>
+        <p:spPr>
+          <a:xfrm>
+            <a:off x="6248400" y="3886200"/>
+            <a:ext cx="0" cy="2667000"/>
+          </a:xfrm>
+          <a:prstGeom prst="line">
+            <a:avLst/>
+          </a:prstGeom>
+          <a:ln w="38100">
+            <a:solidFill>
+              <a:srgbClr val="00FF00"/>
+            </a:solidFill>
+            <a:prstDash val="dash"/>
+          </a:ln>
+        </p:spPr>
+        <p:style>
+          <a:lnRef idx="1">
+            <a:schemeClr val="accent1"/>
+          </a:lnRef>
+          <a:fillRef idx="0">
+            <a:schemeClr val="accent1"/>
+          </a:fillRef>
+          <a:effectRef idx="0">
+            <a:schemeClr val="accent1"/>
+          </a:effectRef>
+          <a:fontRef idx="minor">
+            <a:schemeClr val="tx1"/>
+          </a:fontRef>
+        </p:style>
+      </p:cxnSp>
     </p:spTree>
     <p:extLst>
       <p:ext uri="{BB962C8B-B14F-4D97-AF65-F5344CB8AC3E}">
         <p14:creationId xmlns:p14="http://schemas.microsoft.com/office/powerpoint/2010/main" val="783594436"/>
+      </p:ext>
+    </p:extLst>
+  </p:cSld>
+  <p:clrMapOvr>
+    <a:masterClrMapping/>
+  </p:clrMapOvr>
+</p:sld>
+</file>
+
+<file path=ppt/slides/slide8.xml><?xml version="1.0" encoding="utf-8"?>
+<p:sld xmlns:a="http://schemas.openxmlformats.org/drawingml/2006/main" xmlns:r="http://schemas.openxmlformats.org/officeDocument/2006/relationships" xmlns:p="http://schemas.openxmlformats.org/presentationml/2006/main">
+  <p:cSld>
+    <p:spTree>
+      <p:nvGrpSpPr>
+        <p:cNvPr id="1" name=""/>
+        <p:cNvGrpSpPr/>
+        <p:nvPr/>
+      </p:nvGrpSpPr>
+      <p:grpSpPr>
+        <a:xfrm>
+          <a:off x="0" y="0"/>
+          <a:ext cx="0" cy="0"/>
+          <a:chOff x="0" y="0"/>
+          <a:chExt cx="0" cy="0"/>
+        </a:xfrm>
+      </p:grpSpPr>
+      <p:graphicFrame>
+        <p:nvGraphicFramePr>
+          <p:cNvPr id="2" name="Table 1"/>
+          <p:cNvGraphicFramePr>
+            <a:graphicFrameLocks noGrp="1"/>
+          </p:cNvGraphicFramePr>
+          <p:nvPr>
+            <p:extLst>
+              <p:ext uri="{D42A27DB-BD31-4B8C-83A1-F6EECF244321}">
+                <p14:modId xmlns:p14="http://schemas.microsoft.com/office/powerpoint/2010/main" val="112246064"/>
+              </p:ext>
+            </p:extLst>
+          </p:nvPr>
+        </p:nvGraphicFramePr>
+        <p:xfrm>
+          <a:off x="1524000" y="1397000"/>
+          <a:ext cx="6096000" cy="1112520"/>
+        </p:xfrm>
+        <a:graphic>
+          <a:graphicData uri="http://schemas.openxmlformats.org/drawingml/2006/table">
+            <a:tbl>
+              <a:tblPr firstRow="1" bandRow="1">
+                <a:tableStyleId>{5C22544A-7EE6-4342-B048-85BDC9FD1C3A}</a:tableStyleId>
+              </a:tblPr>
+              <a:tblGrid>
+                <a:gridCol w="1524000"/>
+                <a:gridCol w="1524000"/>
+                <a:gridCol w="1524000"/>
+                <a:gridCol w="1524000"/>
+              </a:tblGrid>
+              <a:tr h="370840">
+                <a:tc>
+                  <a:txBody>
+                    <a:bodyPr/>
+                    <a:lstStyle/>
+                    <a:p>
+                      <a:r>
+                        <a:rPr lang="en-US" dirty="0" smtClean="0"/>
+                        <a:t>Full</a:t>
+                      </a:r>
+                      <a:endParaRPr lang="en-US" dirty="0"/>
+                    </a:p>
+                  </a:txBody>
+                  <a:tcPr/>
+                </a:tc>
+                <a:tc>
+                  <a:txBody>
+                    <a:bodyPr/>
+                    <a:lstStyle/>
+                    <a:p>
+                      <a:r>
+                        <a:rPr lang="en-US" dirty="0" smtClean="0"/>
+                        <a:t>Low</a:t>
+                      </a:r>
+                      <a:endParaRPr lang="en-US" dirty="0"/>
+                    </a:p>
+                  </a:txBody>
+                  <a:tcPr/>
+                </a:tc>
+                <a:tc>
+                  <a:txBody>
+                    <a:bodyPr/>
+                    <a:lstStyle/>
+                    <a:p>
+                      <a:r>
+                        <a:rPr lang="en-US" dirty="0" smtClean="0"/>
+                        <a:t>Med</a:t>
+                      </a:r>
+                      <a:endParaRPr lang="en-US" dirty="0"/>
+                    </a:p>
+                  </a:txBody>
+                  <a:tcPr/>
+                </a:tc>
+                <a:tc>
+                  <a:txBody>
+                    <a:bodyPr/>
+                    <a:lstStyle/>
+                    <a:p>
+                      <a:r>
+                        <a:rPr lang="en-US" dirty="0" smtClean="0"/>
+                        <a:t>High</a:t>
+                      </a:r>
+                      <a:endParaRPr lang="en-US" dirty="0"/>
+                    </a:p>
+                  </a:txBody>
+                  <a:tcPr/>
+                </a:tc>
+              </a:tr>
+              <a:tr h="370840">
+                <a:tc>
+                  <a:txBody>
+                    <a:bodyPr/>
+                    <a:lstStyle/>
+                    <a:p>
+                      <a:r>
+                        <a:rPr lang="en-US" dirty="0" smtClean="0"/>
+                        <a:t>1</a:t>
+                      </a:r>
+                      <a:endParaRPr lang="en-US" dirty="0"/>
+                    </a:p>
+                  </a:txBody>
+                  <a:tcPr/>
+                </a:tc>
+                <a:tc>
+                  <a:txBody>
+                    <a:bodyPr/>
+                    <a:lstStyle/>
+                    <a:p>
+                      <a:r>
+                        <a:rPr lang="en-US" dirty="0" smtClean="0"/>
+                        <a:t>1</a:t>
+                      </a:r>
+                      <a:endParaRPr lang="en-US" dirty="0"/>
+                    </a:p>
+                  </a:txBody>
+                  <a:tcPr/>
+                </a:tc>
+                <a:tc>
+                  <a:txBody>
+                    <a:bodyPr/>
+                    <a:lstStyle/>
+                    <a:p>
+                      <a:r>
+                        <a:rPr lang="en-US" dirty="0" smtClean="0"/>
+                        <a:t>1</a:t>
+                      </a:r>
+                      <a:endParaRPr lang="en-US" dirty="0"/>
+                    </a:p>
+                  </a:txBody>
+                  <a:tcPr/>
+                </a:tc>
+                <a:tc>
+                  <a:txBody>
+                    <a:bodyPr/>
+                    <a:lstStyle/>
+                    <a:p>
+                      <a:r>
+                        <a:rPr lang="en-US" dirty="0" smtClean="0"/>
+                        <a:t>3</a:t>
+                      </a:r>
+                      <a:endParaRPr lang="en-US" dirty="0"/>
+                    </a:p>
+                  </a:txBody>
+                  <a:tcPr/>
+                </a:tc>
+              </a:tr>
+              <a:tr h="370840">
+                <a:tc>
+                  <a:txBody>
+                    <a:bodyPr/>
+                    <a:lstStyle/>
+                    <a:p>
+                      <a:r>
+                        <a:rPr lang="en-US" dirty="0" smtClean="0"/>
+                        <a:t>4</a:t>
+                      </a:r>
+                      <a:endParaRPr lang="en-US" dirty="0"/>
+                    </a:p>
+                  </a:txBody>
+                  <a:tcPr/>
+                </a:tc>
+                <a:tc>
+                  <a:txBody>
+                    <a:bodyPr/>
+                    <a:lstStyle/>
+                    <a:p>
+                      <a:r>
+                        <a:rPr lang="en-US" dirty="0" smtClean="0"/>
+                        <a:t>5</a:t>
+                      </a:r>
+                      <a:endParaRPr lang="en-US" dirty="0"/>
+                    </a:p>
+                  </a:txBody>
+                  <a:tcPr/>
+                </a:tc>
+                <a:tc>
+                  <a:txBody>
+                    <a:bodyPr/>
+                    <a:lstStyle/>
+                    <a:p>
+                      <a:r>
+                        <a:rPr lang="en-US" dirty="0" smtClean="0"/>
+                        <a:t>5</a:t>
+                      </a:r>
+                      <a:endParaRPr lang="en-US" dirty="0"/>
+                    </a:p>
+                  </a:txBody>
+                  <a:tcPr/>
+                </a:tc>
+                <a:tc>
+                  <a:txBody>
+                    <a:bodyPr/>
+                    <a:lstStyle/>
+                    <a:p>
+                      <a:r>
+                        <a:rPr lang="en-US" dirty="0" smtClean="0"/>
+                        <a:t>4</a:t>
+                      </a:r>
+                      <a:endParaRPr lang="en-US" dirty="0"/>
+                    </a:p>
+                  </a:txBody>
+                  <a:tcPr/>
+                </a:tc>
+              </a:tr>
+            </a:tbl>
+          </a:graphicData>
+        </a:graphic>
+      </p:graphicFrame>
+      <p:graphicFrame>
+        <p:nvGraphicFramePr>
+          <p:cNvPr id="3" name="Table 2"/>
+          <p:cNvGraphicFramePr>
+            <a:graphicFrameLocks noGrp="1"/>
+          </p:cNvGraphicFramePr>
+          <p:nvPr>
+            <p:extLst>
+              <p:ext uri="{D42A27DB-BD31-4B8C-83A1-F6EECF244321}">
+                <p14:modId xmlns:p14="http://schemas.microsoft.com/office/powerpoint/2010/main" val="496237489"/>
+              </p:ext>
+            </p:extLst>
+          </p:nvPr>
+        </p:nvGraphicFramePr>
+        <p:xfrm>
+          <a:off x="1524000" y="3048000"/>
+          <a:ext cx="6096000" cy="1112520"/>
+        </p:xfrm>
+        <a:graphic>
+          <a:graphicData uri="http://schemas.openxmlformats.org/drawingml/2006/table">
+            <a:tbl>
+              <a:tblPr firstRow="1" bandRow="1">
+                <a:tableStyleId>{5C22544A-7EE6-4342-B048-85BDC9FD1C3A}</a:tableStyleId>
+              </a:tblPr>
+              <a:tblGrid>
+                <a:gridCol w="1524000"/>
+                <a:gridCol w="1524000"/>
+                <a:gridCol w="1524000"/>
+                <a:gridCol w="1524000"/>
+              </a:tblGrid>
+              <a:tr h="370840">
+                <a:tc>
+                  <a:txBody>
+                    <a:bodyPr/>
+                    <a:lstStyle/>
+                    <a:p>
+                      <a:r>
+                        <a:rPr lang="en-US" dirty="0" smtClean="0"/>
+                        <a:t>Full</a:t>
+                      </a:r>
+                      <a:endParaRPr lang="en-US" dirty="0"/>
+                    </a:p>
+                  </a:txBody>
+                  <a:tcPr/>
+                </a:tc>
+                <a:tc>
+                  <a:txBody>
+                    <a:bodyPr/>
+                    <a:lstStyle/>
+                    <a:p>
+                      <a:r>
+                        <a:rPr lang="en-US" dirty="0" smtClean="0"/>
+                        <a:t>Low</a:t>
+                      </a:r>
+                      <a:endParaRPr lang="en-US" dirty="0"/>
+                    </a:p>
+                  </a:txBody>
+                  <a:tcPr/>
+                </a:tc>
+                <a:tc>
+                  <a:txBody>
+                    <a:bodyPr/>
+                    <a:lstStyle/>
+                    <a:p>
+                      <a:r>
+                        <a:rPr lang="en-US" dirty="0" smtClean="0"/>
+                        <a:t>Med</a:t>
+                      </a:r>
+                      <a:endParaRPr lang="en-US" dirty="0"/>
+                    </a:p>
+                  </a:txBody>
+                  <a:tcPr/>
+                </a:tc>
+                <a:tc>
+                  <a:txBody>
+                    <a:bodyPr/>
+                    <a:lstStyle/>
+                    <a:p>
+                      <a:r>
+                        <a:rPr lang="en-US" dirty="0" smtClean="0"/>
+                        <a:t>High</a:t>
+                      </a:r>
+                      <a:endParaRPr lang="en-US" dirty="0"/>
+                    </a:p>
+                  </a:txBody>
+                  <a:tcPr/>
+                </a:tc>
+              </a:tr>
+              <a:tr h="370840">
+                <a:tc>
+                  <a:txBody>
+                    <a:bodyPr/>
+                    <a:lstStyle/>
+                    <a:p>
+                      <a:r>
+                        <a:rPr lang="en-US" dirty="0" smtClean="0"/>
+                        <a:t>1</a:t>
+                      </a:r>
+                      <a:endParaRPr lang="en-US" dirty="0"/>
+                    </a:p>
+                  </a:txBody>
+                  <a:tcPr/>
+                </a:tc>
+                <a:tc>
+                  <a:txBody>
+                    <a:bodyPr/>
+                    <a:lstStyle/>
+                    <a:p>
+                      <a:r>
+                        <a:rPr lang="en-US" dirty="0" smtClean="0"/>
+                        <a:t>1</a:t>
+                      </a:r>
+                      <a:endParaRPr lang="en-US" dirty="0"/>
+                    </a:p>
+                  </a:txBody>
+                  <a:tcPr/>
+                </a:tc>
+                <a:tc>
+                  <a:txBody>
+                    <a:bodyPr/>
+                    <a:lstStyle/>
+                    <a:p>
+                      <a:r>
+                        <a:rPr lang="en-US" dirty="0" smtClean="0"/>
+                        <a:t>1</a:t>
+                      </a:r>
+                      <a:endParaRPr lang="en-US" dirty="0"/>
+                    </a:p>
+                  </a:txBody>
+                  <a:tcPr/>
+                </a:tc>
+                <a:tc>
+                  <a:txBody>
+                    <a:bodyPr/>
+                    <a:lstStyle/>
+                    <a:p>
+                      <a:r>
+                        <a:rPr lang="en-US" dirty="0" smtClean="0"/>
+                        <a:t>1</a:t>
+                      </a:r>
+                      <a:endParaRPr lang="en-US" dirty="0"/>
+                    </a:p>
+                  </a:txBody>
+                  <a:tcPr/>
+                </a:tc>
+              </a:tr>
+              <a:tr h="370840">
+                <a:tc>
+                  <a:txBody>
+                    <a:bodyPr/>
+                    <a:lstStyle/>
+                    <a:p>
+                      <a:r>
+                        <a:rPr lang="en-US" dirty="0" smtClean="0"/>
+                        <a:t>5</a:t>
+                      </a:r>
+                      <a:endParaRPr lang="en-US" dirty="0"/>
+                    </a:p>
+                  </a:txBody>
+                  <a:tcPr/>
+                </a:tc>
+                <a:tc>
+                  <a:txBody>
+                    <a:bodyPr/>
+                    <a:lstStyle/>
+                    <a:p>
+                      <a:r>
+                        <a:rPr lang="en-US" dirty="0" smtClean="0"/>
+                        <a:t>5</a:t>
+                      </a:r>
+                      <a:endParaRPr lang="en-US" dirty="0"/>
+                    </a:p>
+                  </a:txBody>
+                  <a:tcPr/>
+                </a:tc>
+                <a:tc>
+                  <a:txBody>
+                    <a:bodyPr/>
+                    <a:lstStyle/>
+                    <a:p>
+                      <a:r>
+                        <a:rPr lang="en-US" dirty="0" smtClean="0"/>
+                        <a:t>4</a:t>
+                      </a:r>
+                      <a:endParaRPr lang="en-US" dirty="0"/>
+                    </a:p>
+                  </a:txBody>
+                  <a:tcPr/>
+                </a:tc>
+                <a:tc>
+                  <a:txBody>
+                    <a:bodyPr/>
+                    <a:lstStyle/>
+                    <a:p>
+                      <a:r>
+                        <a:rPr lang="en-US" dirty="0" smtClean="0"/>
+                        <a:t>6</a:t>
+                      </a:r>
+                      <a:endParaRPr lang="en-US" dirty="0"/>
+                    </a:p>
+                  </a:txBody>
+                  <a:tcPr/>
+                </a:tc>
+              </a:tr>
+            </a:tbl>
+          </a:graphicData>
+        </a:graphic>
+      </p:graphicFrame>
+      <p:sp>
+        <p:nvSpPr>
+          <p:cNvPr id="4" name="TextBox 3"/>
+          <p:cNvSpPr txBox="1"/>
+          <p:nvPr/>
+        </p:nvSpPr>
+        <p:spPr>
+          <a:xfrm>
+            <a:off x="2667000" y="990600"/>
+            <a:ext cx="2209800" cy="369332"/>
+          </a:xfrm>
+          <a:prstGeom prst="rect">
+            <a:avLst/>
+          </a:prstGeom>
+          <a:noFill/>
+        </p:spPr>
+        <p:txBody>
+          <a:bodyPr wrap="square" rtlCol="0">
+            <a:spAutoFit/>
+          </a:bodyPr>
+          <a:lstStyle/>
+          <a:p>
+            <a:r>
+              <a:rPr lang="en-US" dirty="0" smtClean="0"/>
+              <a:t>Old Settings</a:t>
+            </a:r>
+            <a:endParaRPr lang="en-US" dirty="0"/>
+          </a:p>
+        </p:txBody>
+      </p:sp>
+      <p:sp>
+        <p:nvSpPr>
+          <p:cNvPr id="5" name="TextBox 4"/>
+          <p:cNvSpPr txBox="1"/>
+          <p:nvPr/>
+        </p:nvSpPr>
+        <p:spPr>
+          <a:xfrm>
+            <a:off x="2514600" y="2667000"/>
+            <a:ext cx="2209800" cy="369332"/>
+          </a:xfrm>
+          <a:prstGeom prst="rect">
+            <a:avLst/>
+          </a:prstGeom>
+          <a:noFill/>
+        </p:spPr>
+        <p:txBody>
+          <a:bodyPr wrap="square" rtlCol="0">
+            <a:spAutoFit/>
+          </a:bodyPr>
+          <a:lstStyle/>
+          <a:p>
+            <a:r>
+              <a:rPr lang="en-US" dirty="0" smtClean="0"/>
+              <a:t>New Settings to try</a:t>
+            </a:r>
+            <a:endParaRPr lang="en-US" dirty="0"/>
+          </a:p>
+        </p:txBody>
+      </p:sp>
+      <p:graphicFrame>
+        <p:nvGraphicFramePr>
+          <p:cNvPr id="6" name="Table 5"/>
+          <p:cNvGraphicFramePr>
+            <a:graphicFrameLocks noGrp="1"/>
+          </p:cNvGraphicFramePr>
+          <p:nvPr>
+            <p:extLst>
+              <p:ext uri="{D42A27DB-BD31-4B8C-83A1-F6EECF244321}">
+                <p14:modId xmlns:p14="http://schemas.microsoft.com/office/powerpoint/2010/main" val="2366504128"/>
+              </p:ext>
+            </p:extLst>
+          </p:nvPr>
+        </p:nvGraphicFramePr>
+        <p:xfrm>
+          <a:off x="1524000" y="4419600"/>
+          <a:ext cx="6096000" cy="1112520"/>
+        </p:xfrm>
+        <a:graphic>
+          <a:graphicData uri="http://schemas.openxmlformats.org/drawingml/2006/table">
+            <a:tbl>
+              <a:tblPr firstRow="1" bandRow="1">
+                <a:tableStyleId>{5C22544A-7EE6-4342-B048-85BDC9FD1C3A}</a:tableStyleId>
+              </a:tblPr>
+              <a:tblGrid>
+                <a:gridCol w="1219200"/>
+                <a:gridCol w="1219200"/>
+                <a:gridCol w="1219200"/>
+                <a:gridCol w="1219200"/>
+                <a:gridCol w="1219200"/>
+              </a:tblGrid>
+              <a:tr h="370840">
+                <a:tc>
+                  <a:txBody>
+                    <a:bodyPr/>
+                    <a:lstStyle/>
+                    <a:p>
+                      <a:r>
+                        <a:rPr lang="en-US" dirty="0" smtClean="0"/>
+                        <a:t>Full</a:t>
+                      </a:r>
+                      <a:endParaRPr lang="en-US" dirty="0"/>
+                    </a:p>
+                  </a:txBody>
+                  <a:tcPr/>
+                </a:tc>
+                <a:tc>
+                  <a:txBody>
+                    <a:bodyPr/>
+                    <a:lstStyle/>
+                    <a:p>
+                      <a:r>
+                        <a:rPr lang="en-US" dirty="0" smtClean="0"/>
+                        <a:t>Low</a:t>
+                      </a:r>
+                      <a:endParaRPr lang="en-US" dirty="0"/>
+                    </a:p>
+                  </a:txBody>
+                  <a:tcPr/>
+                </a:tc>
+                <a:tc>
+                  <a:txBody>
+                    <a:bodyPr/>
+                    <a:lstStyle/>
+                    <a:p>
+                      <a:r>
+                        <a:rPr lang="en-US" dirty="0" err="1" smtClean="0"/>
+                        <a:t>MedLow</a:t>
+                      </a:r>
+                      <a:endParaRPr lang="en-US" dirty="0"/>
+                    </a:p>
+                  </a:txBody>
+                  <a:tcPr/>
+                </a:tc>
+                <a:tc>
+                  <a:txBody>
+                    <a:bodyPr/>
+                    <a:lstStyle/>
+                    <a:p>
+                      <a:r>
+                        <a:rPr lang="en-US" dirty="0" err="1" smtClean="0"/>
+                        <a:t>MedHigh</a:t>
+                      </a:r>
+                      <a:endParaRPr lang="en-US" dirty="0"/>
+                    </a:p>
+                  </a:txBody>
+                  <a:tcPr/>
+                </a:tc>
+                <a:tc>
+                  <a:txBody>
+                    <a:bodyPr/>
+                    <a:lstStyle/>
+                    <a:p>
+                      <a:r>
+                        <a:rPr lang="en-US" dirty="0" smtClean="0"/>
+                        <a:t>High</a:t>
+                      </a:r>
+                      <a:endParaRPr lang="en-US" dirty="0"/>
+                    </a:p>
+                  </a:txBody>
+                  <a:tcPr/>
+                </a:tc>
+              </a:tr>
+              <a:tr h="370840">
+                <a:tc>
+                  <a:txBody>
+                    <a:bodyPr/>
+                    <a:lstStyle/>
+                    <a:p>
+                      <a:r>
+                        <a:rPr lang="en-US" dirty="0" smtClean="0"/>
+                        <a:t>1</a:t>
+                      </a:r>
+                      <a:endParaRPr lang="en-US" dirty="0"/>
+                    </a:p>
+                  </a:txBody>
+                  <a:tcPr/>
+                </a:tc>
+                <a:tc>
+                  <a:txBody>
+                    <a:bodyPr/>
+                    <a:lstStyle/>
+                    <a:p>
+                      <a:r>
+                        <a:rPr lang="en-US" dirty="0" smtClean="0"/>
+                        <a:t>1</a:t>
+                      </a:r>
+                      <a:endParaRPr lang="en-US" dirty="0"/>
+                    </a:p>
+                  </a:txBody>
+                  <a:tcPr/>
+                </a:tc>
+                <a:tc>
+                  <a:txBody>
+                    <a:bodyPr/>
+                    <a:lstStyle/>
+                    <a:p>
+                      <a:r>
+                        <a:rPr lang="en-US" dirty="0" smtClean="0"/>
+                        <a:t>1</a:t>
+                      </a:r>
+                      <a:endParaRPr lang="en-US" dirty="0"/>
+                    </a:p>
+                  </a:txBody>
+                  <a:tcPr/>
+                </a:tc>
+                <a:tc>
+                  <a:txBody>
+                    <a:bodyPr/>
+                    <a:lstStyle/>
+                    <a:p>
+                      <a:r>
+                        <a:rPr lang="en-US" dirty="0" smtClean="0"/>
+                        <a:t>1</a:t>
+                      </a:r>
+                      <a:endParaRPr lang="en-US" dirty="0"/>
+                    </a:p>
+                  </a:txBody>
+                  <a:tcPr/>
+                </a:tc>
+                <a:tc>
+                  <a:txBody>
+                    <a:bodyPr/>
+                    <a:lstStyle/>
+                    <a:p>
+                      <a:r>
+                        <a:rPr lang="en-US" dirty="0" smtClean="0"/>
+                        <a:t>1</a:t>
+                      </a:r>
+                      <a:endParaRPr lang="en-US" dirty="0"/>
+                    </a:p>
+                  </a:txBody>
+                  <a:tcPr/>
+                </a:tc>
+              </a:tr>
+              <a:tr h="370840">
+                <a:tc>
+                  <a:txBody>
+                    <a:bodyPr/>
+                    <a:lstStyle/>
+                    <a:p>
+                      <a:r>
+                        <a:rPr lang="en-US" dirty="0" smtClean="0"/>
+                        <a:t>5</a:t>
+                      </a:r>
+                      <a:endParaRPr lang="en-US" dirty="0"/>
+                    </a:p>
+                  </a:txBody>
+                  <a:tcPr/>
+                </a:tc>
+                <a:tc>
+                  <a:txBody>
+                    <a:bodyPr/>
+                    <a:lstStyle/>
+                    <a:p>
+                      <a:r>
+                        <a:rPr lang="en-US" dirty="0" smtClean="0"/>
+                        <a:t>5</a:t>
+                      </a:r>
+                      <a:endParaRPr lang="en-US" dirty="0"/>
+                    </a:p>
+                  </a:txBody>
+                  <a:tcPr/>
+                </a:tc>
+                <a:tc>
+                  <a:txBody>
+                    <a:bodyPr/>
+                    <a:lstStyle/>
+                    <a:p>
+                      <a:r>
+                        <a:rPr lang="en-US" dirty="0" smtClean="0"/>
+                        <a:t>5</a:t>
+                      </a:r>
+                      <a:endParaRPr lang="en-US" dirty="0"/>
+                    </a:p>
+                  </a:txBody>
+                  <a:tcPr/>
+                </a:tc>
+                <a:tc>
+                  <a:txBody>
+                    <a:bodyPr/>
+                    <a:lstStyle/>
+                    <a:p>
+                      <a:r>
+                        <a:rPr lang="en-US" dirty="0" smtClean="0"/>
+                        <a:t>4</a:t>
+                      </a:r>
+                      <a:endParaRPr lang="en-US" dirty="0"/>
+                    </a:p>
+                  </a:txBody>
+                  <a:tcPr/>
+                </a:tc>
+                <a:tc>
+                  <a:txBody>
+                    <a:bodyPr/>
+                    <a:lstStyle/>
+                    <a:p>
+                      <a:r>
+                        <a:rPr lang="en-US" dirty="0" smtClean="0"/>
+                        <a:t>6</a:t>
+                      </a:r>
+                      <a:endParaRPr lang="en-US" dirty="0"/>
+                    </a:p>
+                  </a:txBody>
+                  <a:tcPr/>
+                </a:tc>
+              </a:tr>
+            </a:tbl>
+          </a:graphicData>
+        </a:graphic>
+      </p:graphicFrame>
+    </p:spTree>
+    <p:extLst>
+      <p:ext uri="{BB962C8B-B14F-4D97-AF65-F5344CB8AC3E}">
+        <p14:creationId xmlns:p14="http://schemas.microsoft.com/office/powerpoint/2010/main" val="1040585465"/>
       </p:ext>
     </p:extLst>
   </p:cSld>

</xml_diff>